<commit_message>
Minor fix to Chapter 2 slide
</commit_message>
<xml_diff>
--- a/ServerAuthoring2SelfServe1/SelfServe1.pptx
+++ b/ServerAuthoring2SelfServe1/SelfServe1.pptx
@@ -72,10 +72,10 @@
         </a:solidFill>
         <a:effectLst/>
         <a:uFillTx/>
-        <a:latin typeface="+mj-lt"/>
-        <a:ea typeface="+mj-ea"/>
-        <a:cs typeface="+mj-cs"/>
-        <a:sym typeface="Arial"/>
+        <a:latin typeface="+mn-lt"/>
+        <a:ea typeface="+mn-ea"/>
+        <a:cs typeface="+mn-cs"/>
+        <a:sym typeface="Helvetica"/>
       </a:defRPr>
     </a:lvl1pPr>
     <a:lvl2pPr marL="0" marR="0" indent="0" algn="l" defTabSz="914400" rtl="0" fontAlgn="auto" latinLnBrk="0" hangingPunct="0">
@@ -102,10 +102,10 @@
         </a:solidFill>
         <a:effectLst/>
         <a:uFillTx/>
-        <a:latin typeface="+mj-lt"/>
-        <a:ea typeface="+mj-ea"/>
-        <a:cs typeface="+mj-cs"/>
-        <a:sym typeface="Arial"/>
+        <a:latin typeface="+mn-lt"/>
+        <a:ea typeface="+mn-ea"/>
+        <a:cs typeface="+mn-cs"/>
+        <a:sym typeface="Helvetica"/>
       </a:defRPr>
     </a:lvl2pPr>
     <a:lvl3pPr marL="0" marR="0" indent="0" algn="l" defTabSz="914400" rtl="0" fontAlgn="auto" latinLnBrk="0" hangingPunct="0">
@@ -132,10 +132,10 @@
         </a:solidFill>
         <a:effectLst/>
         <a:uFillTx/>
-        <a:latin typeface="+mj-lt"/>
-        <a:ea typeface="+mj-ea"/>
-        <a:cs typeface="+mj-cs"/>
-        <a:sym typeface="Arial"/>
+        <a:latin typeface="+mn-lt"/>
+        <a:ea typeface="+mn-ea"/>
+        <a:cs typeface="+mn-cs"/>
+        <a:sym typeface="Helvetica"/>
       </a:defRPr>
     </a:lvl3pPr>
     <a:lvl4pPr marL="0" marR="0" indent="0" algn="l" defTabSz="914400" rtl="0" fontAlgn="auto" latinLnBrk="0" hangingPunct="0">
@@ -162,10 +162,10 @@
         </a:solidFill>
         <a:effectLst/>
         <a:uFillTx/>
-        <a:latin typeface="+mj-lt"/>
-        <a:ea typeface="+mj-ea"/>
-        <a:cs typeface="+mj-cs"/>
-        <a:sym typeface="Arial"/>
+        <a:latin typeface="+mn-lt"/>
+        <a:ea typeface="+mn-ea"/>
+        <a:cs typeface="+mn-cs"/>
+        <a:sym typeface="Helvetica"/>
       </a:defRPr>
     </a:lvl4pPr>
     <a:lvl5pPr marL="0" marR="0" indent="0" algn="l" defTabSz="914400" rtl="0" fontAlgn="auto" latinLnBrk="0" hangingPunct="0">
@@ -192,10 +192,10 @@
         </a:solidFill>
         <a:effectLst/>
         <a:uFillTx/>
-        <a:latin typeface="+mj-lt"/>
-        <a:ea typeface="+mj-ea"/>
-        <a:cs typeface="+mj-cs"/>
-        <a:sym typeface="Arial"/>
+        <a:latin typeface="+mn-lt"/>
+        <a:ea typeface="+mn-ea"/>
+        <a:cs typeface="+mn-cs"/>
+        <a:sym typeface="Helvetica"/>
       </a:defRPr>
     </a:lvl5pPr>
     <a:lvl6pPr marL="0" marR="0" indent="0" algn="l" defTabSz="914400" rtl="0" fontAlgn="auto" latinLnBrk="0" hangingPunct="0">
@@ -222,10 +222,10 @@
         </a:solidFill>
         <a:effectLst/>
         <a:uFillTx/>
-        <a:latin typeface="+mj-lt"/>
-        <a:ea typeface="+mj-ea"/>
-        <a:cs typeface="+mj-cs"/>
-        <a:sym typeface="Arial"/>
+        <a:latin typeface="+mn-lt"/>
+        <a:ea typeface="+mn-ea"/>
+        <a:cs typeface="+mn-cs"/>
+        <a:sym typeface="Helvetica"/>
       </a:defRPr>
     </a:lvl6pPr>
     <a:lvl7pPr marL="0" marR="0" indent="0" algn="l" defTabSz="914400" rtl="0" fontAlgn="auto" latinLnBrk="0" hangingPunct="0">
@@ -252,10 +252,10 @@
         </a:solidFill>
         <a:effectLst/>
         <a:uFillTx/>
-        <a:latin typeface="+mj-lt"/>
-        <a:ea typeface="+mj-ea"/>
-        <a:cs typeface="+mj-cs"/>
-        <a:sym typeface="Arial"/>
+        <a:latin typeface="+mn-lt"/>
+        <a:ea typeface="+mn-ea"/>
+        <a:cs typeface="+mn-cs"/>
+        <a:sym typeface="Helvetica"/>
       </a:defRPr>
     </a:lvl7pPr>
     <a:lvl8pPr marL="0" marR="0" indent="0" algn="l" defTabSz="914400" rtl="0" fontAlgn="auto" latinLnBrk="0" hangingPunct="0">
@@ -282,10 +282,10 @@
         </a:solidFill>
         <a:effectLst/>
         <a:uFillTx/>
-        <a:latin typeface="+mj-lt"/>
-        <a:ea typeface="+mj-ea"/>
-        <a:cs typeface="+mj-cs"/>
-        <a:sym typeface="Arial"/>
+        <a:latin typeface="+mn-lt"/>
+        <a:ea typeface="+mn-ea"/>
+        <a:cs typeface="+mn-cs"/>
+        <a:sym typeface="Helvetica"/>
       </a:defRPr>
     </a:lvl8pPr>
     <a:lvl9pPr marL="0" marR="0" indent="0" algn="l" defTabSz="914400" rtl="0" fontAlgn="auto" latinLnBrk="0" hangingPunct="0">
@@ -312,10 +312,10 @@
         </a:solidFill>
         <a:effectLst/>
         <a:uFillTx/>
-        <a:latin typeface="+mj-lt"/>
-        <a:ea typeface="+mj-ea"/>
-        <a:cs typeface="+mj-cs"/>
-        <a:sym typeface="Arial"/>
+        <a:latin typeface="+mn-lt"/>
+        <a:ea typeface="+mn-ea"/>
+        <a:cs typeface="+mn-cs"/>
+        <a:sym typeface="Helvetica"/>
       </a:defRPr>
     </a:lvl9pPr>
   </p:defaultTextStyle>
@@ -505,8 +505,8 @@
         </p:nvSpPr>
         <p:spPr>
           <a:xfrm>
-            <a:off x="0" y="2998148"/>
-            <a:ext cx="9144002" cy="2"/>
+            <a:off x="-1" y="2998148"/>
+            <a:ext cx="9144003" cy="3"/>
           </a:xfrm>
           <a:prstGeom prst="line">
             <a:avLst/>
@@ -698,7 +698,7 @@
         <p:spPr>
           <a:xfrm>
             <a:off x="587599" y="3182315"/>
-            <a:ext cx="712952" cy="484377"/>
+            <a:ext cx="712952" cy="484378"/>
           </a:xfrm>
           <a:prstGeom prst="rect">
             <a:avLst/>
@@ -718,8 +718,8 @@
         </p:nvSpPr>
         <p:spPr>
           <a:xfrm>
-            <a:off x="6216389" y="4599638"/>
-            <a:ext cx="336812" cy="335249"/>
+            <a:off x="6216392" y="4599639"/>
+            <a:ext cx="336810" cy="335247"/>
           </a:xfrm>
           <a:prstGeom prst="rect">
             <a:avLst/>
@@ -771,7 +771,7 @@
         <p:spPr>
           <a:xfrm>
             <a:off x="311698" y="4236825"/>
-            <a:ext cx="5998804" cy="598801"/>
+            <a:ext cx="5998804" cy="598802"/>
           </a:xfrm>
           <a:prstGeom prst="rect">
             <a:avLst/>
@@ -917,7 +917,7 @@
         <p:spPr>
           <a:xfrm>
             <a:off x="311698" y="991475"/>
-            <a:ext cx="8520602" cy="1917901"/>
+            <a:ext cx="8520602" cy="1917902"/>
           </a:xfrm>
           <a:prstGeom prst="rect">
             <a:avLst/>
@@ -948,8 +948,8 @@
         </p:nvSpPr>
         <p:spPr>
           <a:xfrm>
-            <a:off x="311698" y="3071298"/>
-            <a:ext cx="8520602" cy="901801"/>
+            <a:off x="311698" y="3071297"/>
+            <a:ext cx="8520602" cy="901802"/>
           </a:xfrm>
           <a:prstGeom prst="rect">
             <a:avLst/>
@@ -1107,8 +1107,8 @@
         </p:nvSpPr>
         <p:spPr>
           <a:xfrm>
-            <a:off x="0" y="2998148"/>
-            <a:ext cx="9144002" cy="2"/>
+            <a:off x="-1" y="2998148"/>
+            <a:ext cx="9144003" cy="3"/>
           </a:xfrm>
           <a:prstGeom prst="line">
             <a:avLst/>
@@ -1167,7 +1167,7 @@
         <p:spPr>
           <a:xfrm>
             <a:off x="510448" y="3171200"/>
-            <a:ext cx="8123103" cy="778802"/>
+            <a:ext cx="8123103" cy="778803"/>
           </a:xfrm>
           <a:prstGeom prst="rect">
             <a:avLst/>
@@ -1202,8 +1202,8 @@
         </p:nvSpPr>
         <p:spPr>
           <a:xfrm>
-            <a:off x="6216389" y="4599638"/>
-            <a:ext cx="336812" cy="335249"/>
+            <a:off x="6216392" y="4599639"/>
+            <a:ext cx="336810" cy="335247"/>
           </a:xfrm>
           <a:prstGeom prst="rect">
             <a:avLst/>
@@ -1700,7 +1700,7 @@
         <p:spPr>
           <a:xfrm>
             <a:off x="311698" y="555600"/>
-            <a:ext cx="2808001" cy="755699"/>
+            <a:ext cx="2808002" cy="755699"/>
           </a:xfrm>
           <a:prstGeom prst="rect">
             <a:avLst/>
@@ -1732,7 +1732,7 @@
         <p:spPr>
           <a:xfrm>
             <a:off x="311698" y="1389598"/>
-            <a:ext cx="2808001" cy="3179403"/>
+            <a:ext cx="2808002" cy="3179404"/>
           </a:xfrm>
           <a:prstGeom prst="rect">
             <a:avLst/>
@@ -1855,7 +1855,7 @@
         <p:spPr>
           <a:xfrm>
             <a:off x="490250" y="526348"/>
-            <a:ext cx="5797502" cy="4090803"/>
+            <a:ext cx="5797502" cy="4090804"/>
           </a:xfrm>
           <a:prstGeom prst="rect">
             <a:avLst/>
@@ -1954,6 +1954,10 @@
                 <a:solidFill>
                   <a:srgbClr val="000000"/>
                 </a:solidFill>
+                <a:latin typeface="+mj-lt"/>
+                <a:ea typeface="+mj-ea"/>
+                <a:cs typeface="+mj-cs"/>
+                <a:sym typeface="Arial"/>
               </a:defRPr>
             </a:pPr>
           </a:p>
@@ -1968,7 +1972,7 @@
         <p:spPr>
           <a:xfrm>
             <a:off x="5029675" y="4495500"/>
-            <a:ext cx="468302" cy="2"/>
+            <a:ext cx="468303" cy="3"/>
           </a:xfrm>
           <a:prstGeom prst="line">
             <a:avLst/>
@@ -2086,7 +2090,7 @@
         <p:spPr>
           <a:xfrm>
             <a:off x="265500" y="1205825"/>
-            <a:ext cx="4045199" cy="1509601"/>
+            <a:ext cx="4045199" cy="1509602"/>
           </a:xfrm>
           <a:prstGeom prst="rect">
             <a:avLst/>
@@ -2179,7 +2183,7 @@
         <p:spPr>
           <a:xfrm>
             <a:off x="0" y="5045700"/>
-            <a:ext cx="9144000" cy="97802"/>
+            <a:ext cx="9144000" cy="97803"/>
           </a:xfrm>
           <a:prstGeom prst="rect">
             <a:avLst/>
@@ -2200,6 +2204,10 @@
                 <a:solidFill>
                   <a:srgbClr val="000000"/>
                 </a:solidFill>
+                <a:latin typeface="+mj-lt"/>
+                <a:ea typeface="+mj-ea"/>
+                <a:cs typeface="+mj-cs"/>
+                <a:sym typeface="Arial"/>
               </a:defRPr>
             </a:pPr>
           </a:p>
@@ -2216,7 +2224,7 @@
         <p:spPr>
           <a:xfrm>
             <a:off x="311698" y="381650"/>
-            <a:ext cx="8520602" cy="572701"/>
+            <a:ext cx="8520602" cy="572702"/>
           </a:xfrm>
           <a:prstGeom prst="rect">
             <a:avLst/>
@@ -2231,7 +2239,7 @@
           </a:extLst>
         </p:spPr>
         <p:txBody>
-          <a:bodyPr lIns="91423" tIns="91423" rIns="91423" bIns="91423">
+          <a:bodyPr lIns="91422" tIns="91422" rIns="91422" bIns="91422">
             <a:normAutofit fontScale="100000" lnSpcReduction="0"/>
           </a:bodyPr>
           <a:lstStyle/>
@@ -2269,7 +2277,7 @@
           </a:extLst>
         </p:spPr>
         <p:txBody>
-          <a:bodyPr lIns="91423" tIns="91423" rIns="91423" bIns="91423">
+          <a:bodyPr lIns="91422" tIns="91422" rIns="91422" bIns="91422">
             <a:normAutofit fontScale="100000" lnSpcReduction="0"/>
           </a:bodyPr>
           <a:lstStyle/>
@@ -2315,8 +2323,8 @@
         </p:nvSpPr>
         <p:spPr>
           <a:xfrm>
-            <a:off x="8684346" y="4692392"/>
-            <a:ext cx="336811" cy="335249"/>
+            <a:off x="8684348" y="4692393"/>
+            <a:ext cx="336809" cy="335247"/>
           </a:xfrm>
           <a:prstGeom prst="rect">
             <a:avLst/>
@@ -2326,7 +2334,7 @@
           </a:ln>
         </p:spPr>
         <p:txBody>
-          <a:bodyPr wrap="none" lIns="91423" tIns="91423" rIns="91423" bIns="91423" anchor="ctr">
+          <a:bodyPr wrap="none" lIns="91422" tIns="91422" rIns="91422" bIns="91422" anchor="ctr">
             <a:spAutoFit/>
           </a:bodyPr>
           <a:lstStyle>
@@ -3184,8 +3192,8 @@
         </p:nvSpPr>
         <p:spPr>
           <a:xfrm>
-            <a:off x="510449" y="1257298"/>
-            <a:ext cx="8354701" cy="1588504"/>
+            <a:off x="510449" y="1257297"/>
+            <a:ext cx="8354701" cy="1588505"/>
           </a:xfrm>
           <a:prstGeom prst="rect">
             <a:avLst/>
@@ -3194,8 +3202,8 @@
         <p:txBody>
           <a:bodyPr/>
           <a:lstStyle>
-            <a:lvl1pPr defTabSz="877823">
-              <a:defRPr sz="4608"/>
+            <a:lvl1pPr defTabSz="877822">
+              <a:defRPr sz="4600"/>
             </a:lvl1pPr>
           </a:lstStyle>
           <a:p>
@@ -3216,8 +3224,8 @@
         </p:nvSpPr>
         <p:spPr>
           <a:xfrm>
-            <a:off x="1412649" y="3182323"/>
-            <a:ext cx="7452602" cy="630001"/>
+            <a:off x="1412649" y="3182322"/>
+            <a:ext cx="7452602" cy="630003"/>
           </a:xfrm>
           <a:prstGeom prst="rect">
             <a:avLst/>
@@ -3270,8 +3278,8 @@
         </p:nvSpPr>
         <p:spPr>
           <a:xfrm>
-            <a:off x="311697" y="1152474"/>
-            <a:ext cx="5487687" cy="3768001"/>
+            <a:off x="311696" y="1152474"/>
+            <a:ext cx="5487689" cy="3768002"/>
           </a:xfrm>
           <a:prstGeom prst="rect">
             <a:avLst/>
@@ -3318,10 +3326,10 @@
         </p:nvGrpSpPr>
         <p:grpSpPr>
           <a:xfrm>
-            <a:off x="0" y="-3"/>
-            <a:ext cx="9144000" cy="793205"/>
-            <a:chOff x="0" y="-1"/>
-            <a:chExt cx="9144000" cy="793204"/>
+            <a:off x="0" y="-8"/>
+            <a:ext cx="9144000" cy="793207"/>
+            <a:chOff x="0" y="-4"/>
+            <a:chExt cx="9144000" cy="793205"/>
           </a:xfrm>
         </p:grpSpPr>
         <p:sp>
@@ -3332,8 +3340,8 @@
           </p:nvSpPr>
           <p:spPr>
             <a:xfrm>
-              <a:off x="0" y="-2"/>
-              <a:ext cx="9144000" cy="793205"/>
+              <a:off x="0" y="-5"/>
+              <a:ext cx="9144000" cy="793207"/>
             </a:xfrm>
             <a:prstGeom prst="rect">
               <a:avLst/>
@@ -3377,8 +3385,8 @@
           </p:nvSpPr>
           <p:spPr>
             <a:xfrm>
-              <a:off x="0" y="32123"/>
-              <a:ext cx="9144000" cy="728949"/>
+              <a:off x="0" y="32121"/>
+              <a:ext cx="9144000" cy="728947"/>
             </a:xfrm>
             <a:prstGeom prst="rect">
               <a:avLst/>
@@ -3396,7 +3404,7 @@
             </a:extLst>
           </p:spPr>
           <p:txBody>
-            <a:bodyPr wrap="square" lIns="91423" tIns="91423" rIns="91423" bIns="91423" numCol="1" anchor="ctr">
+            <a:bodyPr wrap="square" lIns="91422" tIns="91422" rIns="91422" bIns="91422" numCol="1" anchor="ctr">
               <a:spAutoFit/>
             </a:bodyPr>
             <a:lstStyle>
@@ -3433,15 +3441,15 @@
           <a:blip r:embed="rId2">
             <a:extLst/>
           </a:blip>
-          <a:srcRect l="1541" t="7300" r="1541" b="33456"/>
+          <a:srcRect l="1541" t="7300" r="1541" b="33455"/>
           <a:stretch>
             <a:fillRect/>
           </a:stretch>
         </p:blipFill>
         <p:spPr>
           <a:xfrm>
-            <a:off x="4539411" y="1558456"/>
-            <a:ext cx="3366433" cy="2543317"/>
+            <a:off x="4539410" y="1558456"/>
+            <a:ext cx="3366434" cy="2543318"/>
           </a:xfrm>
           <a:prstGeom prst="rect">
             <a:avLst/>
@@ -3487,8 +3495,8 @@
         </p:nvSpPr>
         <p:spPr>
           <a:xfrm>
-            <a:off x="4572000" y="843254"/>
-            <a:ext cx="4224900" cy="4127646"/>
+            <a:off x="4572000" y="843253"/>
+            <a:ext cx="4224900" cy="4127648"/>
           </a:xfrm>
           <a:prstGeom prst="rect">
             <a:avLst/>
@@ -3651,10 +3659,10 @@
         </p:nvGrpSpPr>
         <p:grpSpPr>
           <a:xfrm>
-            <a:off x="0" y="-3"/>
-            <a:ext cx="9144000" cy="793205"/>
-            <a:chOff x="0" y="-1"/>
-            <a:chExt cx="9144000" cy="793204"/>
+            <a:off x="0" y="-8"/>
+            <a:ext cx="9144000" cy="793207"/>
+            <a:chOff x="0" y="-4"/>
+            <a:chExt cx="9144000" cy="793205"/>
           </a:xfrm>
         </p:grpSpPr>
         <p:sp>
@@ -3665,8 +3673,8 @@
           </p:nvSpPr>
           <p:spPr>
             <a:xfrm>
-              <a:off x="0" y="-2"/>
-              <a:ext cx="9144000" cy="793205"/>
+              <a:off x="0" y="-5"/>
+              <a:ext cx="9144000" cy="793207"/>
             </a:xfrm>
             <a:prstGeom prst="rect">
               <a:avLst/>
@@ -3710,8 +3718,8 @@
           </p:nvSpPr>
           <p:spPr>
             <a:xfrm>
-              <a:off x="0" y="32123"/>
-              <a:ext cx="9144000" cy="728949"/>
+              <a:off x="0" y="32121"/>
+              <a:ext cx="9144000" cy="728947"/>
             </a:xfrm>
             <a:prstGeom prst="rect">
               <a:avLst/>
@@ -3729,7 +3737,7 @@
             </a:extLst>
           </p:spPr>
           <p:txBody>
-            <a:bodyPr wrap="square" lIns="91423" tIns="91423" rIns="91423" bIns="91423" numCol="1" anchor="ctr">
+            <a:bodyPr wrap="square" lIns="91422" tIns="91422" rIns="91422" bIns="91422" numCol="1" anchor="ctr">
               <a:spAutoFit/>
             </a:bodyPr>
             <a:lstStyle>
@@ -3748,7 +3756,7 @@
             <a:p>
               <a:pPr/>
               <a:r>
-                <a:t>Introduction to FME Server</a:t>
+                <a:t>Self Serve I</a:t>
               </a:r>
             </a:p>
           </p:txBody>
@@ -3773,8 +3781,8 @@
         </p:blipFill>
         <p:spPr>
           <a:xfrm>
-            <a:off x="384803" y="1715693"/>
-            <a:ext cx="3912443" cy="2382646"/>
+            <a:off x="384803" y="1715692"/>
+            <a:ext cx="3912443" cy="2382647"/>
           </a:xfrm>
           <a:prstGeom prst="rect">
             <a:avLst/>
@@ -3832,7 +3840,7 @@
         <p:spPr>
           <a:xfrm>
             <a:off x="271156" y="1023381"/>
-            <a:ext cx="3999902" cy="1521277"/>
+            <a:ext cx="3999902" cy="1521278"/>
           </a:xfrm>
           <a:prstGeom prst="rect">
             <a:avLst/>
@@ -3893,10 +3901,10 @@
         </p:nvGrpSpPr>
         <p:grpSpPr>
           <a:xfrm>
-            <a:off x="0" y="-3"/>
-            <a:ext cx="9144000" cy="793205"/>
-            <a:chOff x="0" y="-1"/>
-            <a:chExt cx="9144000" cy="793204"/>
+            <a:off x="0" y="-8"/>
+            <a:ext cx="9144000" cy="793207"/>
+            <a:chOff x="0" y="-4"/>
+            <a:chExt cx="9144000" cy="793205"/>
           </a:xfrm>
         </p:grpSpPr>
         <p:sp>
@@ -3907,8 +3915,8 @@
           </p:nvSpPr>
           <p:spPr>
             <a:xfrm>
-              <a:off x="0" y="-2"/>
-              <a:ext cx="9144000" cy="793205"/>
+              <a:off x="0" y="-5"/>
+              <a:ext cx="9144000" cy="793207"/>
             </a:xfrm>
             <a:prstGeom prst="rect">
               <a:avLst/>
@@ -3952,8 +3960,8 @@
           </p:nvSpPr>
           <p:spPr>
             <a:xfrm>
-              <a:off x="0" y="32123"/>
-              <a:ext cx="9144000" cy="728949"/>
+              <a:off x="0" y="32121"/>
+              <a:ext cx="9144000" cy="728947"/>
             </a:xfrm>
             <a:prstGeom prst="rect">
               <a:avLst/>
@@ -3971,7 +3979,7 @@
             </a:extLst>
           </p:spPr>
           <p:txBody>
-            <a:bodyPr wrap="square" lIns="91423" tIns="91423" rIns="91423" bIns="91423" numCol="1" anchor="ctr">
+            <a:bodyPr wrap="square" lIns="91422" tIns="91422" rIns="91422" bIns="91422" numCol="1" anchor="ctr">
               <a:spAutoFit/>
             </a:bodyPr>
             <a:lstStyle>
@@ -4131,10 +4139,10 @@
         </p:nvGrpSpPr>
         <p:grpSpPr>
           <a:xfrm>
-            <a:off x="0" y="-3"/>
-            <a:ext cx="9144000" cy="793205"/>
-            <a:chOff x="0" y="-1"/>
-            <a:chExt cx="9144000" cy="793204"/>
+            <a:off x="0" y="-8"/>
+            <a:ext cx="9144000" cy="793207"/>
+            <a:chOff x="0" y="-4"/>
+            <a:chExt cx="9144000" cy="793205"/>
           </a:xfrm>
         </p:grpSpPr>
         <p:sp>
@@ -4145,8 +4153,8 @@
           </p:nvSpPr>
           <p:spPr>
             <a:xfrm>
-              <a:off x="0" y="-2"/>
-              <a:ext cx="9144000" cy="793205"/>
+              <a:off x="0" y="-5"/>
+              <a:ext cx="9144000" cy="793207"/>
             </a:xfrm>
             <a:prstGeom prst="rect">
               <a:avLst/>
@@ -4190,8 +4198,8 @@
           </p:nvSpPr>
           <p:spPr>
             <a:xfrm>
-              <a:off x="0" y="32123"/>
-              <a:ext cx="9144000" cy="728949"/>
+              <a:off x="0" y="32121"/>
+              <a:ext cx="9144000" cy="728947"/>
             </a:xfrm>
             <a:prstGeom prst="rect">
               <a:avLst/>
@@ -4209,7 +4217,7 @@
             </a:extLst>
           </p:spPr>
           <p:txBody>
-            <a:bodyPr wrap="square" lIns="91423" tIns="91423" rIns="91423" bIns="91423" numCol="1" anchor="ctr">
+            <a:bodyPr wrap="square" lIns="91422" tIns="91422" rIns="91422" bIns="91422" numCol="1" anchor="ctr">
               <a:spAutoFit/>
             </a:bodyPr>
             <a:lstStyle>
@@ -4253,7 +4261,7 @@
         <p:spPr>
           <a:xfrm>
             <a:off x="3760866" y="2456495"/>
-            <a:ext cx="4605251" cy="925840"/>
+            <a:ext cx="4605252" cy="925841"/>
           </a:xfrm>
           <a:prstGeom prst="rect">
             <a:avLst/>
@@ -4283,7 +4291,7 @@
         <p:spPr>
           <a:xfrm>
             <a:off x="3723044" y="3751098"/>
-            <a:ext cx="4680894" cy="925839"/>
+            <a:ext cx="4680895" cy="925840"/>
           </a:xfrm>
           <a:prstGeom prst="rect">
             <a:avLst/>
@@ -4340,8 +4348,8 @@
         </p:nvSpPr>
         <p:spPr>
           <a:xfrm>
-            <a:off x="311698" y="1152474"/>
-            <a:ext cx="4360804" cy="3768002"/>
+            <a:off x="311698" y="1152473"/>
+            <a:ext cx="4360804" cy="3768004"/>
           </a:xfrm>
           <a:prstGeom prst="rect">
             <a:avLst/>
@@ -4388,10 +4396,10 @@
         </p:nvGrpSpPr>
         <p:grpSpPr>
           <a:xfrm>
-            <a:off x="0" y="-3"/>
-            <a:ext cx="9144000" cy="793205"/>
-            <a:chOff x="0" y="-1"/>
-            <a:chExt cx="9144000" cy="793204"/>
+            <a:off x="0" y="-8"/>
+            <a:ext cx="9144000" cy="793207"/>
+            <a:chOff x="0" y="-4"/>
+            <a:chExt cx="9144000" cy="793205"/>
           </a:xfrm>
         </p:grpSpPr>
         <p:sp>
@@ -4402,8 +4410,8 @@
           </p:nvSpPr>
           <p:spPr>
             <a:xfrm>
-              <a:off x="0" y="-2"/>
-              <a:ext cx="9144000" cy="793205"/>
+              <a:off x="0" y="-5"/>
+              <a:ext cx="9144000" cy="793207"/>
             </a:xfrm>
             <a:prstGeom prst="rect">
               <a:avLst/>
@@ -4447,8 +4455,8 @@
           </p:nvSpPr>
           <p:spPr>
             <a:xfrm>
-              <a:off x="0" y="32123"/>
-              <a:ext cx="9144000" cy="728949"/>
+              <a:off x="0" y="32121"/>
+              <a:ext cx="9144000" cy="728947"/>
             </a:xfrm>
             <a:prstGeom prst="rect">
               <a:avLst/>
@@ -4466,7 +4474,7 @@
             </a:extLst>
           </p:spPr>
           <p:txBody>
-            <a:bodyPr wrap="square" lIns="91423" tIns="91423" rIns="91423" bIns="91423" numCol="1" anchor="ctr">
+            <a:bodyPr wrap="square" lIns="91422" tIns="91422" rIns="91422" bIns="91422" numCol="1" anchor="ctr">
               <a:spAutoFit/>
             </a:bodyPr>
             <a:lstStyle>
@@ -4503,15 +4511,14 @@
           <a:blip r:embed="rId2">
             <a:extLst/>
           </a:blip>
-          <a:srcRect l="0" t="0" r="0" b="0"/>
           <a:stretch>
             <a:fillRect/>
           </a:stretch>
         </p:blipFill>
         <p:spPr>
           <a:xfrm>
-            <a:off x="3302528" y="2383320"/>
-            <a:ext cx="5350003" cy="2263896"/>
+            <a:off x="3302527" y="2383320"/>
+            <a:ext cx="5350004" cy="2263896"/>
           </a:xfrm>
           <a:prstGeom prst="rect">
             <a:avLst/>
@@ -4568,8 +4575,8 @@
         </p:nvSpPr>
         <p:spPr>
           <a:xfrm>
-            <a:off x="311698" y="1152474"/>
-            <a:ext cx="4360804" cy="3768002"/>
+            <a:off x="311698" y="1152473"/>
+            <a:ext cx="4360804" cy="3768004"/>
           </a:xfrm>
           <a:prstGeom prst="rect">
             <a:avLst/>
@@ -4630,10 +4637,10 @@
         </p:nvGrpSpPr>
         <p:grpSpPr>
           <a:xfrm>
-            <a:off x="0" y="-3"/>
-            <a:ext cx="9144000" cy="793205"/>
-            <a:chOff x="0" y="-1"/>
-            <a:chExt cx="9144000" cy="793204"/>
+            <a:off x="0" y="-8"/>
+            <a:ext cx="9144000" cy="793207"/>
+            <a:chOff x="0" y="-4"/>
+            <a:chExt cx="9144000" cy="793205"/>
           </a:xfrm>
         </p:grpSpPr>
         <p:sp>
@@ -4644,8 +4651,8 @@
           </p:nvSpPr>
           <p:spPr>
             <a:xfrm>
-              <a:off x="0" y="-2"/>
-              <a:ext cx="9144000" cy="793205"/>
+              <a:off x="0" y="-5"/>
+              <a:ext cx="9144000" cy="793207"/>
             </a:xfrm>
             <a:prstGeom prst="rect">
               <a:avLst/>
@@ -4689,8 +4696,8 @@
           </p:nvSpPr>
           <p:spPr>
             <a:xfrm>
-              <a:off x="0" y="32123"/>
-              <a:ext cx="9144000" cy="728949"/>
+              <a:off x="0" y="32121"/>
+              <a:ext cx="9144000" cy="728947"/>
             </a:xfrm>
             <a:prstGeom prst="rect">
               <a:avLst/>
@@ -4708,7 +4715,7 @@
             </a:extLst>
           </p:spPr>
           <p:txBody>
-            <a:bodyPr wrap="square" lIns="91423" tIns="91423" rIns="91423" bIns="91423" numCol="1" anchor="ctr">
+            <a:bodyPr wrap="square" lIns="91422" tIns="91422" rIns="91422" bIns="91422" numCol="1" anchor="ctr">
               <a:spAutoFit/>
             </a:bodyPr>
             <a:lstStyle>
@@ -4751,8 +4758,8 @@
         </p:blipFill>
         <p:spPr>
           <a:xfrm>
-            <a:off x="5502405" y="1165863"/>
-            <a:ext cx="2365413" cy="3507337"/>
+            <a:off x="5502404" y="1165863"/>
+            <a:ext cx="2365414" cy="3507338"/>
           </a:xfrm>
           <a:prstGeom prst="rect">
             <a:avLst/>
@@ -4809,8 +4816,8 @@
         </p:nvSpPr>
         <p:spPr>
           <a:xfrm>
-            <a:off x="311698" y="1152474"/>
-            <a:ext cx="4755297" cy="3768002"/>
+            <a:off x="311698" y="1152473"/>
+            <a:ext cx="4755297" cy="3768004"/>
           </a:xfrm>
           <a:prstGeom prst="rect">
             <a:avLst/>
@@ -4857,10 +4864,10 @@
         </p:nvGrpSpPr>
         <p:grpSpPr>
           <a:xfrm>
-            <a:off x="0" y="-3"/>
-            <a:ext cx="9144000" cy="793205"/>
-            <a:chOff x="0" y="-1"/>
-            <a:chExt cx="9144000" cy="793204"/>
+            <a:off x="0" y="-8"/>
+            <a:ext cx="9144000" cy="793207"/>
+            <a:chOff x="0" y="-4"/>
+            <a:chExt cx="9144000" cy="793205"/>
           </a:xfrm>
         </p:grpSpPr>
         <p:sp>
@@ -4871,8 +4878,8 @@
           </p:nvSpPr>
           <p:spPr>
             <a:xfrm>
-              <a:off x="0" y="-2"/>
-              <a:ext cx="9144000" cy="793205"/>
+              <a:off x="0" y="-5"/>
+              <a:ext cx="9144000" cy="793207"/>
             </a:xfrm>
             <a:prstGeom prst="rect">
               <a:avLst/>
@@ -4916,8 +4923,8 @@
           </p:nvSpPr>
           <p:spPr>
             <a:xfrm>
-              <a:off x="0" y="32123"/>
-              <a:ext cx="9144000" cy="728949"/>
+              <a:off x="0" y="32121"/>
+              <a:ext cx="9144000" cy="728947"/>
             </a:xfrm>
             <a:prstGeom prst="rect">
               <a:avLst/>
@@ -4935,7 +4942,7 @@
             </a:extLst>
           </p:spPr>
           <p:txBody>
-            <a:bodyPr wrap="square" lIns="91423" tIns="91423" rIns="91423" bIns="91423" numCol="1" anchor="ctr">
+            <a:bodyPr wrap="square" lIns="91422" tIns="91422" rIns="91422" bIns="91422" numCol="1" anchor="ctr">
               <a:spAutoFit/>
             </a:bodyPr>
             <a:lstStyle>
@@ -4978,8 +4985,8 @@
         </p:blipFill>
         <p:spPr>
           <a:xfrm>
-            <a:off x="2349894" y="2770801"/>
-            <a:ext cx="6045830" cy="1718715"/>
+            <a:off x="2349893" y="2770801"/>
+            <a:ext cx="6045831" cy="1718716"/>
           </a:xfrm>
           <a:prstGeom prst="rect">
             <a:avLst/>
@@ -5036,8 +5043,8 @@
         </p:nvSpPr>
         <p:spPr>
           <a:xfrm>
-            <a:off x="311698" y="1152474"/>
-            <a:ext cx="4360804" cy="3768002"/>
+            <a:off x="311698" y="1152473"/>
+            <a:ext cx="4360804" cy="3768004"/>
           </a:xfrm>
           <a:prstGeom prst="rect">
             <a:avLst/>
@@ -5084,10 +5091,10 @@
         </p:nvGrpSpPr>
         <p:grpSpPr>
           <a:xfrm>
-            <a:off x="0" y="-3"/>
-            <a:ext cx="9144000" cy="793205"/>
-            <a:chOff x="0" y="-1"/>
-            <a:chExt cx="9144000" cy="793204"/>
+            <a:off x="0" y="-8"/>
+            <a:ext cx="9144000" cy="793207"/>
+            <a:chOff x="0" y="-4"/>
+            <a:chExt cx="9144000" cy="793205"/>
           </a:xfrm>
         </p:grpSpPr>
         <p:sp>
@@ -5098,8 +5105,8 @@
           </p:nvSpPr>
           <p:spPr>
             <a:xfrm>
-              <a:off x="0" y="-2"/>
-              <a:ext cx="9144000" cy="793205"/>
+              <a:off x="0" y="-5"/>
+              <a:ext cx="9144000" cy="793207"/>
             </a:xfrm>
             <a:prstGeom prst="rect">
               <a:avLst/>
@@ -5143,8 +5150,8 @@
           </p:nvSpPr>
           <p:spPr>
             <a:xfrm>
-              <a:off x="0" y="32123"/>
-              <a:ext cx="9144000" cy="728949"/>
+              <a:off x="0" y="32121"/>
+              <a:ext cx="9144000" cy="728947"/>
             </a:xfrm>
             <a:prstGeom prst="rect">
               <a:avLst/>
@@ -5162,7 +5169,7 @@
             </a:extLst>
           </p:spPr>
           <p:txBody>
-            <a:bodyPr wrap="square" lIns="91423" tIns="91423" rIns="91423" bIns="91423" numCol="1" anchor="ctr">
+            <a:bodyPr wrap="square" lIns="91422" tIns="91422" rIns="91422" bIns="91422" numCol="1" anchor="ctr">
               <a:spAutoFit/>
             </a:bodyPr>
             <a:lstStyle>
@@ -5205,8 +5212,8 @@
         </p:blipFill>
         <p:spPr>
           <a:xfrm>
-            <a:off x="2213257" y="2447256"/>
-            <a:ext cx="6233539" cy="1926446"/>
+            <a:off x="2213256" y="2447256"/>
+            <a:ext cx="6233540" cy="1926447"/>
           </a:xfrm>
           <a:prstGeom prst="rect">
             <a:avLst/>
@@ -5263,8 +5270,8 @@
         </p:nvSpPr>
         <p:spPr>
           <a:xfrm>
-            <a:off x="311697" y="1152474"/>
-            <a:ext cx="5487687" cy="3768002"/>
+            <a:off x="311696" y="1152473"/>
+            <a:ext cx="5487689" cy="3768004"/>
           </a:xfrm>
           <a:prstGeom prst="rect">
             <a:avLst/>
@@ -5325,10 +5332,10 @@
         </p:nvGrpSpPr>
         <p:grpSpPr>
           <a:xfrm>
-            <a:off x="0" y="-3"/>
-            <a:ext cx="9144000" cy="793205"/>
-            <a:chOff x="0" y="-1"/>
-            <a:chExt cx="9144000" cy="793204"/>
+            <a:off x="0" y="-8"/>
+            <a:ext cx="9144000" cy="793207"/>
+            <a:chOff x="0" y="-4"/>
+            <a:chExt cx="9144000" cy="793205"/>
           </a:xfrm>
         </p:grpSpPr>
         <p:sp>
@@ -5339,8 +5346,8 @@
           </p:nvSpPr>
           <p:spPr>
             <a:xfrm>
-              <a:off x="0" y="-2"/>
-              <a:ext cx="9144000" cy="793205"/>
+              <a:off x="0" y="-5"/>
+              <a:ext cx="9144000" cy="793207"/>
             </a:xfrm>
             <a:prstGeom prst="rect">
               <a:avLst/>
@@ -5384,8 +5391,8 @@
           </p:nvSpPr>
           <p:spPr>
             <a:xfrm>
-              <a:off x="0" y="32123"/>
-              <a:ext cx="9144000" cy="728949"/>
+              <a:off x="0" y="32121"/>
+              <a:ext cx="9144000" cy="728947"/>
             </a:xfrm>
             <a:prstGeom prst="rect">
               <a:avLst/>
@@ -5403,7 +5410,7 @@
             </a:extLst>
           </p:spPr>
           <p:txBody>
-            <a:bodyPr wrap="square" lIns="91423" tIns="91423" rIns="91423" bIns="91423" numCol="1" anchor="ctr">
+            <a:bodyPr wrap="square" lIns="91422" tIns="91422" rIns="91422" bIns="91422" numCol="1" anchor="ctr">
               <a:spAutoFit/>
             </a:bodyPr>
             <a:lstStyle>
@@ -5440,15 +5447,14 @@
           <a:blip r:embed="rId2">
             <a:extLst/>
           </a:blip>
-          <a:srcRect l="0" t="0" r="0" b="0"/>
           <a:stretch>
             <a:fillRect/>
           </a:stretch>
         </p:blipFill>
         <p:spPr>
           <a:xfrm>
-            <a:off x="3184321" y="2935691"/>
-            <a:ext cx="5740733" cy="1864637"/>
+            <a:off x="3184320" y="2935690"/>
+            <a:ext cx="5740734" cy="1864638"/>
           </a:xfrm>
           <a:prstGeom prst="rect">
             <a:avLst/>
@@ -5733,10 +5739,10 @@
             </a:solidFill>
             <a:effectLst/>
             <a:uFillTx/>
-            <a:latin typeface="+mj-lt"/>
-            <a:ea typeface="+mj-ea"/>
-            <a:cs typeface="+mj-cs"/>
-            <a:sym typeface="Arial"/>
+            <a:latin typeface="+mn-lt"/>
+            <a:ea typeface="+mn-ea"/>
+            <a:cs typeface="+mn-cs"/>
+            <a:sym typeface="Helvetica"/>
           </a:defRPr>
         </a:defPPr>
         <a:lvl1pPr marL="0" marR="0" indent="0" algn="l" defTabSz="914400" rtl="0" fontAlgn="auto" latinLnBrk="1" hangingPunct="0">
@@ -6310,10 +6316,10 @@
             </a:solidFill>
             <a:effectLst/>
             <a:uFillTx/>
-            <a:latin typeface="+mj-lt"/>
-            <a:ea typeface="+mj-ea"/>
-            <a:cs typeface="+mj-cs"/>
-            <a:sym typeface="Arial"/>
+            <a:latin typeface="+mn-lt"/>
+            <a:ea typeface="+mn-ea"/>
+            <a:cs typeface="+mn-cs"/>
+            <a:sym typeface="Helvetica"/>
           </a:defRPr>
         </a:defPPr>
         <a:lvl1pPr marL="0" marR="0" indent="0" algn="l" defTabSz="914400" rtl="0" fontAlgn="auto" latinLnBrk="1" hangingPunct="0">
@@ -6817,10 +6823,10 @@
             </a:solidFill>
             <a:effectLst/>
             <a:uFillTx/>
-            <a:latin typeface="+mj-lt"/>
-            <a:ea typeface="+mj-ea"/>
-            <a:cs typeface="+mj-cs"/>
-            <a:sym typeface="Arial"/>
+            <a:latin typeface="+mn-lt"/>
+            <a:ea typeface="+mn-ea"/>
+            <a:cs typeface="+mn-cs"/>
+            <a:sym typeface="Helvetica"/>
           </a:defRPr>
         </a:defPPr>
         <a:lvl1pPr marL="0" marR="0" indent="0" algn="l" defTabSz="914400" rtl="0" fontAlgn="auto" latinLnBrk="1" hangingPunct="0">
@@ -7394,10 +7400,10 @@
             </a:solidFill>
             <a:effectLst/>
             <a:uFillTx/>
-            <a:latin typeface="+mj-lt"/>
-            <a:ea typeface="+mj-ea"/>
-            <a:cs typeface="+mj-cs"/>
-            <a:sym typeface="Arial"/>
+            <a:latin typeface="+mn-lt"/>
+            <a:ea typeface="+mn-ea"/>
+            <a:cs typeface="+mn-cs"/>
+            <a:sym typeface="Helvetica"/>
           </a:defRPr>
         </a:defPPr>
         <a:lvl1pPr marL="0" marR="0" indent="0" algn="l" defTabSz="914400" rtl="0" fontAlgn="auto" latinLnBrk="1" hangingPunct="0">

</xml_diff>